<commit_message>
Add test for TextFragments which fails due to a bug in TextFragments. will fix soon
</commit_message>
<xml_diff>
--- a/doc/test/TextFragments.pptx
+++ b/doc/test/TextFragments.pptx
@@ -10,7 +10,7 @@
     <p:sldId id="259" r:id="rId4"/>
     <p:sldId id="258" r:id="rId5"/>
     <p:sldId id="260" r:id="rId6"/>
-    <p:sldId id="263" r:id="rId7"/>
+    <p:sldId id="264" r:id="rId7"/>
     <p:sldId id="262" r:id="rId8"/>
   </p:sldIdLst>
   <p:sldSz cx="9144000" cy="6858000" type="screen4x3"/>
@@ -122,14 +122,14 @@
           <p14:sldIdLst>
             <p14:sldId id="258"/>
             <p14:sldId id="260"/>
-            <p14:sldId id="263"/>
+            <p14:sldId id="264"/>
             <p14:sldId id="262"/>
           </p14:sldIdLst>
         </p14:section>
       </p14:sectionLst>
     </p:ext>
     <p:ext uri="{EFAFB233-063F-42B5-8137-9DF3F51BA10A}">
-      <p15:sldGuideLst xmlns:p15="http://schemas.microsoft.com/office/powerpoint/2012/main"/>
+      <p15:sldGuideLst xmlns="" xmlns:p15="http://schemas.microsoft.com/office/powerpoint/2012/main"/>
     </p:ext>
   </p:extLst>
 </p:presentation>
@@ -323,7 +323,7 @@
                 </a:solidFill>
               </a:rPr>
               <a:pPr/>
-              <a:t>6/26/2014</a:t>
+              <a:t>19-Jun-15</a:t>
             </a:fld>
             <a:endParaRPr lang="en-US">
               <a:solidFill>
@@ -525,7 +525,7 @@
                 </a:solidFill>
               </a:rPr>
               <a:pPr/>
-              <a:t>6/26/2014</a:t>
+              <a:t>19-Jun-15</a:t>
             </a:fld>
             <a:endParaRPr lang="en-US">
               <a:solidFill>
@@ -737,7 +737,7 @@
                 </a:solidFill>
               </a:rPr>
               <a:pPr/>
-              <a:t>6/26/2014</a:t>
+              <a:t>19-Jun-15</a:t>
             </a:fld>
             <a:endParaRPr lang="en-US">
               <a:solidFill>
@@ -1011,7 +1011,7 @@
                 </a:solidFill>
               </a:rPr>
               <a:pPr/>
-              <a:t>6/26/2014</a:t>
+              <a:t>19-Jun-15</a:t>
             </a:fld>
             <a:endParaRPr lang="en-US">
               <a:solidFill>
@@ -1213,7 +1213,7 @@
                 </a:solidFill>
               </a:rPr>
               <a:pPr/>
-              <a:t>6/26/2014</a:t>
+              <a:t>19-Jun-15</a:t>
             </a:fld>
             <a:endParaRPr lang="en-US">
               <a:solidFill>
@@ -1491,7 +1491,7 @@
                 </a:solidFill>
               </a:rPr>
               <a:pPr/>
-              <a:t>6/26/2014</a:t>
+              <a:t>19-Jun-15</a:t>
             </a:fld>
             <a:endParaRPr lang="en-US">
               <a:solidFill>
@@ -1811,7 +1811,7 @@
                 </a:solidFill>
               </a:rPr>
               <a:pPr/>
-              <a:t>6/26/2014</a:t>
+              <a:t>19-Jun-15</a:t>
             </a:fld>
             <a:endParaRPr lang="en-US">
               <a:solidFill>
@@ -2265,7 +2265,7 @@
                 </a:solidFill>
               </a:rPr>
               <a:pPr/>
-              <a:t>6/26/2014</a:t>
+              <a:t>19-Jun-15</a:t>
             </a:fld>
             <a:endParaRPr lang="en-US">
               <a:solidFill>
@@ -2415,7 +2415,7 @@
                 </a:solidFill>
               </a:rPr>
               <a:pPr/>
-              <a:t>6/26/2014</a:t>
+              <a:t>19-Jun-15</a:t>
             </a:fld>
             <a:endParaRPr lang="en-US">
               <a:solidFill>
@@ -2542,7 +2542,7 @@
                 </a:solidFill>
               </a:rPr>
               <a:pPr/>
-              <a:t>6/26/2014</a:t>
+              <a:t>19-Jun-15</a:t>
             </a:fld>
             <a:endParaRPr lang="en-US">
               <a:solidFill>
@@ -2851,7 +2851,7 @@
                 </a:solidFill>
               </a:rPr>
               <a:pPr/>
-              <a:t>6/26/2014</a:t>
+              <a:t>19-Jun-15</a:t>
             </a:fld>
             <a:endParaRPr lang="en-US">
               <a:solidFill>
@@ -3053,7 +3053,7 @@
                 </a:solidFill>
               </a:rPr>
               <a:pPr/>
-              <a:t>6/26/2014</a:t>
+              <a:t>19-Jun-15</a:t>
             </a:fld>
             <a:endParaRPr lang="en-US">
               <a:solidFill>
@@ -3338,7 +3338,7 @@
                 </a:solidFill>
               </a:rPr>
               <a:pPr/>
-              <a:t>6/26/2014</a:t>
+              <a:t>19-Jun-15</a:t>
             </a:fld>
             <a:endParaRPr lang="en-US">
               <a:solidFill>
@@ -3540,7 +3540,7 @@
                 </a:solidFill>
               </a:rPr>
               <a:pPr/>
-              <a:t>6/26/2014</a:t>
+              <a:t>19-Jun-15</a:t>
             </a:fld>
             <a:endParaRPr lang="en-US">
               <a:solidFill>
@@ -3752,7 +3752,7 @@
                 </a:solidFill>
               </a:rPr>
               <a:pPr/>
-              <a:t>6/26/2014</a:t>
+              <a:t>19-Jun-15</a:t>
             </a:fld>
             <a:endParaRPr lang="en-US">
               <a:solidFill>
@@ -4026,7 +4026,7 @@
                 </a:solidFill>
               </a:rPr>
               <a:pPr/>
-              <a:t>6/26/2014</a:t>
+              <a:t>19-Jun-15</a:t>
             </a:fld>
             <a:endParaRPr lang="en-US">
               <a:solidFill>
@@ -4228,7 +4228,7 @@
                 </a:solidFill>
               </a:rPr>
               <a:pPr/>
-              <a:t>6/26/2014</a:t>
+              <a:t>19-Jun-15</a:t>
             </a:fld>
             <a:endParaRPr lang="en-US">
               <a:solidFill>
@@ -4506,7 +4506,7 @@
                 </a:solidFill>
               </a:rPr>
               <a:pPr/>
-              <a:t>6/26/2014</a:t>
+              <a:t>19-Jun-15</a:t>
             </a:fld>
             <a:endParaRPr lang="en-US">
               <a:solidFill>
@@ -4826,7 +4826,7 @@
                 </a:solidFill>
               </a:rPr>
               <a:pPr/>
-              <a:t>6/26/2014</a:t>
+              <a:t>19-Jun-15</a:t>
             </a:fld>
             <a:endParaRPr lang="en-US">
               <a:solidFill>
@@ -5280,7 +5280,7 @@
                 </a:solidFill>
               </a:rPr>
               <a:pPr/>
-              <a:t>6/26/2014</a:t>
+              <a:t>19-Jun-15</a:t>
             </a:fld>
             <a:endParaRPr lang="en-US">
               <a:solidFill>
@@ -5430,7 +5430,7 @@
                 </a:solidFill>
               </a:rPr>
               <a:pPr/>
-              <a:t>6/26/2014</a:t>
+              <a:t>19-Jun-15</a:t>
             </a:fld>
             <a:endParaRPr lang="en-US">
               <a:solidFill>
@@ -5557,7 +5557,7 @@
                 </a:solidFill>
               </a:rPr>
               <a:pPr/>
-              <a:t>6/26/2014</a:t>
+              <a:t>19-Jun-15</a:t>
             </a:fld>
             <a:endParaRPr lang="en-US">
               <a:solidFill>
@@ -5835,7 +5835,7 @@
                 </a:solidFill>
               </a:rPr>
               <a:pPr/>
-              <a:t>6/26/2014</a:t>
+              <a:t>19-Jun-15</a:t>
             </a:fld>
             <a:endParaRPr lang="en-US">
               <a:solidFill>
@@ -6144,7 +6144,7 @@
                 </a:solidFill>
               </a:rPr>
               <a:pPr/>
-              <a:t>6/26/2014</a:t>
+              <a:t>19-Jun-15</a:t>
             </a:fld>
             <a:endParaRPr lang="en-US">
               <a:solidFill>
@@ -6429,7 +6429,7 @@
                 </a:solidFill>
               </a:rPr>
               <a:pPr/>
-              <a:t>6/26/2014</a:t>
+              <a:t>19-Jun-15</a:t>
             </a:fld>
             <a:endParaRPr lang="en-US">
               <a:solidFill>
@@ -6631,7 +6631,7 @@
                 </a:solidFill>
               </a:rPr>
               <a:pPr/>
-              <a:t>6/26/2014</a:t>
+              <a:t>19-Jun-15</a:t>
             </a:fld>
             <a:endParaRPr lang="en-US">
               <a:solidFill>
@@ -6843,7 +6843,7 @@
                 </a:solidFill>
               </a:rPr>
               <a:pPr/>
-              <a:t>6/26/2014</a:t>
+              <a:t>19-Jun-15</a:t>
             </a:fld>
             <a:endParaRPr lang="en-US">
               <a:solidFill>
@@ -7163,7 +7163,7 @@
                 </a:solidFill>
               </a:rPr>
               <a:pPr/>
-              <a:t>6/26/2014</a:t>
+              <a:t>19-Jun-15</a:t>
             </a:fld>
             <a:endParaRPr lang="en-US">
               <a:solidFill>
@@ -7617,7 +7617,7 @@
                 </a:solidFill>
               </a:rPr>
               <a:pPr/>
-              <a:t>6/26/2014</a:t>
+              <a:t>19-Jun-15</a:t>
             </a:fld>
             <a:endParaRPr lang="en-US">
               <a:solidFill>
@@ -7767,7 +7767,7 @@
                 </a:solidFill>
               </a:rPr>
               <a:pPr/>
-              <a:t>6/26/2014</a:t>
+              <a:t>19-Jun-15</a:t>
             </a:fld>
             <a:endParaRPr lang="en-US">
               <a:solidFill>
@@ -7894,7 +7894,7 @@
                 </a:solidFill>
               </a:rPr>
               <a:pPr/>
-              <a:t>6/26/2014</a:t>
+              <a:t>19-Jun-15</a:t>
             </a:fld>
             <a:endParaRPr lang="en-US">
               <a:solidFill>
@@ -8203,7 +8203,7 @@
                 </a:solidFill>
               </a:rPr>
               <a:pPr/>
-              <a:t>6/26/2014</a:t>
+              <a:t>19-Jun-15</a:t>
             </a:fld>
             <a:endParaRPr lang="en-US">
               <a:solidFill>
@@ -8488,7 +8488,7 @@
                 </a:solidFill>
               </a:rPr>
               <a:pPr/>
-              <a:t>6/26/2014</a:t>
+              <a:t>19-Jun-15</a:t>
             </a:fld>
             <a:endParaRPr lang="en-US">
               <a:solidFill>
@@ -8738,7 +8738,7 @@
                 </a:solidFill>
               </a:rPr>
               <a:pPr/>
-              <a:t>6/26/2014</a:t>
+              <a:t>19-Jun-15</a:t>
             </a:fld>
             <a:endParaRPr lang="en-US">
               <a:solidFill>
@@ -9280,7 +9280,7 @@
                 </a:solidFill>
               </a:rPr>
               <a:pPr/>
-              <a:t>6/26/2014</a:t>
+              <a:t>19-Jun-15</a:t>
             </a:fld>
             <a:endParaRPr lang="en-US">
               <a:solidFill>
@@ -9822,7 +9822,7 @@
                 </a:solidFill>
               </a:rPr>
               <a:pPr/>
-              <a:t>6/26/2014</a:t>
+              <a:t>19-Jun-15</a:t>
             </a:fld>
             <a:endParaRPr lang="en-US">
               <a:solidFill>
@@ -10724,15 +10724,7 @@
                   <a:prstClr val="white"/>
                 </a:solidFill>
               </a:rPr>
-              <a:t>Note: Text will be highlighted in the order they were chosen and added (and not </a:t>
-            </a:r>
-            <a:r>
-              <a:rPr lang="en-US" sz="2400" dirty="0" smtClean="0">
-                <a:solidFill>
-                  <a:prstClr val="white"/>
-                </a:solidFill>
-              </a:rPr>
-              <a:t>based on what comes first in the text frame.)</a:t>
+              <a:t>Note: Text will be highlighted in the order they were chosen and added (and not based on what comes first in the text frame.)</a:t>
             </a:r>
             <a:endParaRPr lang="en-SG" sz="2400" dirty="0">
               <a:solidFill>
@@ -10781,7 +10773,50 @@
       </p:grpSpPr>
       <p:sp>
         <p:nvSpPr>
-          <p:cNvPr id="2" name="文本框 1"/>
+          <p:cNvPr id="3" name="Rectangle 19"/>
+          <p:cNvSpPr/>
+          <p:nvPr/>
+        </p:nvSpPr>
+        <p:spPr>
+          <a:xfrm>
+            <a:off x="4583716" y="0"/>
+            <a:ext cx="4560284" cy="6858000"/>
+          </a:xfrm>
+          <a:prstGeom prst="rect">
+            <a:avLst/>
+          </a:prstGeom>
+          <a:solidFill>
+            <a:srgbClr val="002060"/>
+          </a:solidFill>
+        </p:spPr>
+        <p:style>
+          <a:lnRef idx="2">
+            <a:schemeClr val="accent1">
+              <a:shade val="50000"/>
+            </a:schemeClr>
+          </a:lnRef>
+          <a:fillRef idx="1">
+            <a:schemeClr val="accent1"/>
+          </a:fillRef>
+          <a:effectRef idx="0">
+            <a:schemeClr val="accent1"/>
+          </a:effectRef>
+          <a:fontRef idx="minor">
+            <a:schemeClr val="lt1"/>
+          </a:fontRef>
+        </p:style>
+        <p:txBody>
+          <a:bodyPr rtlCol="0" anchor="ctr"/>
+          <a:lstStyle/>
+          <a:p>
+            <a:pPr algn="ctr"/>
+            <a:endParaRPr lang="en-US"/>
+          </a:p>
+        </p:txBody>
+      </p:sp>
+      <p:sp>
+        <p:nvSpPr>
+          <p:cNvPr id="2" name="Text Fragments Shape"/>
           <p:cNvSpPr txBox="1"/>
           <p:nvPr/>
         </p:nvSpPr>
@@ -11337,7 +11372,50 @@
       </p:grpSpPr>
       <p:sp>
         <p:nvSpPr>
-          <p:cNvPr id="19" name="PPTLabsHighlightTextFragmentsShape88706fb5-d6a2-47f4-9e25-e5d0e2c7e6db"/>
+          <p:cNvPr id="22" name="Rectangle 19"/>
+          <p:cNvSpPr/>
+          <p:nvPr/>
+        </p:nvSpPr>
+        <p:spPr>
+          <a:xfrm>
+            <a:off x="4583716" y="0"/>
+            <a:ext cx="4560284" cy="6858000"/>
+          </a:xfrm>
+          <a:prstGeom prst="rect">
+            <a:avLst/>
+          </a:prstGeom>
+          <a:solidFill>
+            <a:srgbClr val="002060"/>
+          </a:solidFill>
+        </p:spPr>
+        <p:style>
+          <a:lnRef idx="2">
+            <a:schemeClr val="accent1">
+              <a:shade val="50000"/>
+            </a:schemeClr>
+          </a:lnRef>
+          <a:fillRef idx="1">
+            <a:schemeClr val="accent1"/>
+          </a:fillRef>
+          <a:effectRef idx="0">
+            <a:schemeClr val="accent1"/>
+          </a:effectRef>
+          <a:fontRef idx="minor">
+            <a:schemeClr val="lt1"/>
+          </a:fontRef>
+        </p:style>
+        <p:txBody>
+          <a:bodyPr rtlCol="0" anchor="ctr"/>
+          <a:lstStyle/>
+          <a:p>
+            <a:pPr algn="ctr"/>
+            <a:endParaRPr lang="en-US"/>
+          </a:p>
+        </p:txBody>
+      </p:sp>
+      <p:sp>
+        <p:nvSpPr>
+          <p:cNvPr id="19" name="PPTLabsHighlightTextFragmentsShape42be768e-f684-4675-98aa-c9b2bd51dd03"/>
           <p:cNvSpPr/>
           <p:nvPr>
             <p:custDataLst>
@@ -11405,7 +11483,7 @@
       </p:sp>
       <p:grpSp>
         <p:nvGrpSpPr>
-          <p:cNvPr id="18" name="PPTLabsHighlightTextFragmentsShape6afaf3c5-a4b8-4905-a514-de1ffc89998b"/>
+          <p:cNvPr id="18" name="PPTLabsHighlightTextFragmentsShape4e79361a-4b3a-4107-bb5d-e2a495471d62"/>
           <p:cNvGrpSpPr/>
           <p:nvPr/>
         </p:nvGrpSpPr>
@@ -11419,7 +11497,7 @@
         </p:grpSpPr>
         <p:sp>
           <p:nvSpPr>
-            <p:cNvPr id="17" name="PPTLabsHighlightTextFragmentsShapee5d4cba8-fb8d-4463-8b31-e3b6902340a1"/>
+            <p:cNvPr id="17" name="PPTLabsHighlightTextFragmentsShapebe35eaa0-db81-4871-8668-46283434c871"/>
             <p:cNvSpPr/>
             <p:nvPr>
               <p:custDataLst>
@@ -11487,7 +11565,7 @@
         </p:sp>
         <p:sp>
           <p:nvSpPr>
-            <p:cNvPr id="16" name="PPTLabsHighlightTextFragmentsShapea3f2029d-f281-4002-9a91-fa6e6ea7657a"/>
+            <p:cNvPr id="16" name="PPTLabsHighlightTextFragmentsShapeed78b372-3109-427c-9b4c-91a3f2dbdc86"/>
             <p:cNvSpPr/>
             <p:nvPr>
               <p:custDataLst>
@@ -11556,7 +11634,7 @@
       </p:grpSp>
       <p:grpSp>
         <p:nvGrpSpPr>
-          <p:cNvPr id="15" name="PPTLabsHighlightTextFragmentsShape67ffe35d-2ef7-4c67-beea-18e346f36f08"/>
+          <p:cNvPr id="15" name="PPTLabsHighlightTextFragmentsShapedcd3184b-5296-4605-b6ab-a0231d4181bf"/>
           <p:cNvGrpSpPr/>
           <p:nvPr/>
         </p:nvGrpSpPr>
@@ -11570,7 +11648,7 @@
         </p:grpSpPr>
         <p:sp>
           <p:nvSpPr>
-            <p:cNvPr id="14" name="PPTLabsHighlightTextFragmentsShape722dbee3-91b0-4c12-b51f-7fd7eaeee260"/>
+            <p:cNvPr id="14" name="PPTLabsHighlightTextFragmentsShape2a4fdbf8-f59d-4bbb-917f-7f2c763cadb3"/>
             <p:cNvSpPr/>
             <p:nvPr>
               <p:custDataLst>
@@ -11638,7 +11716,7 @@
         </p:sp>
         <p:sp>
           <p:nvSpPr>
-            <p:cNvPr id="13" name="PPTLabsHighlightTextFragmentsShape37b7527d-9580-453a-9ac6-d270ec25126b"/>
+            <p:cNvPr id="13" name="PPTLabsHighlightTextFragmentsShape1c4cd210-7b0a-4fa3-b565-5aa060e4df3f"/>
             <p:cNvSpPr/>
             <p:nvPr>
               <p:custDataLst>
@@ -11707,7 +11785,7 @@
       </p:grpSp>
       <p:sp>
         <p:nvSpPr>
-          <p:cNvPr id="12" name="PPTLabsHighlightTextFragmentsShapec84fa0e2-a546-4555-bc44-fbc7bd07f72a"/>
+          <p:cNvPr id="12" name="PPTLabsHighlightTextFragmentsShape9fe30ee1-d550-4eb2-8af8-0890b879b766"/>
           <p:cNvSpPr/>
           <p:nvPr>
             <p:custDataLst>
@@ -11775,7 +11853,7 @@
       </p:sp>
       <p:sp>
         <p:nvSpPr>
-          <p:cNvPr id="11" name="PPTLabsHighlightTextFragmentsShapefcbd1772-5bed-4461-9860-2269d9c64877"/>
+          <p:cNvPr id="11" name="PPTLabsHighlightTextFragmentsShapef5f134a8-737b-4e55-9ffd-ea187eaeb79c"/>
           <p:cNvSpPr/>
           <p:nvPr>
             <p:custDataLst>
@@ -11843,7 +11921,7 @@
       </p:sp>
       <p:sp>
         <p:nvSpPr>
-          <p:cNvPr id="10" name="PPTLabsHighlightTextFragmentsShape90257b96-eb21-4197-8068-bc71a30536d8"/>
+          <p:cNvPr id="10" name="PPTLabsHighlightTextFragmentsShape11f79e0a-939f-4b6d-b844-bf0b211f93e8"/>
           <p:cNvSpPr/>
           <p:nvPr>
             <p:custDataLst>
@@ -11911,7 +11989,7 @@
       </p:sp>
       <p:sp>
         <p:nvSpPr>
-          <p:cNvPr id="9" name="PPTLabsHighlightTextFragmentsShape9e281dfd-af7e-405f-bdb4-9a80c5de65ab"/>
+          <p:cNvPr id="9" name="PPTLabsHighlightTextFragmentsShape397a058a-b5e8-4724-a23b-f599e8f5fced"/>
           <p:cNvSpPr/>
           <p:nvPr>
             <p:custDataLst>
@@ -11979,7 +12057,7 @@
       </p:sp>
       <p:sp>
         <p:nvSpPr>
-          <p:cNvPr id="8" name="PPTLabsHighlightTextFragmentsShape2c1872ba-91bc-4c7f-85be-178ce2ac00a3"/>
+          <p:cNvPr id="8" name="PPTLabsHighlightTextFragmentsShape3cecb501-93ae-45df-9943-5aff4b6d3e4a"/>
           <p:cNvSpPr/>
           <p:nvPr>
             <p:custDataLst>
@@ -12047,7 +12125,7 @@
       </p:sp>
       <p:sp>
         <p:nvSpPr>
-          <p:cNvPr id="7" name="PPTLabsHighlightTextFragmentsShape734e1cfd-ed01-4166-98e2-c0812f4dd84d"/>
+          <p:cNvPr id="7" name="PPTLabsHighlightTextFragmentsShape5e55848a-6d4a-440c-9473-d9b431aaef09"/>
           <p:cNvSpPr/>
           <p:nvPr>
             <p:custDataLst>
@@ -12115,7 +12193,7 @@
       </p:sp>
       <p:grpSp>
         <p:nvGrpSpPr>
-          <p:cNvPr id="6" name="PPTLabsHighlightTextFragmentsShape5075dd95-a07b-470d-8a8e-914cebd2f758"/>
+          <p:cNvPr id="6" name="PPTLabsHighlightTextFragmentsShape856e8ee1-583e-4ef9-b53b-c096feb76840"/>
           <p:cNvGrpSpPr/>
           <p:nvPr/>
         </p:nvGrpSpPr>
@@ -12129,7 +12207,7 @@
         </p:grpSpPr>
         <p:sp>
           <p:nvSpPr>
-            <p:cNvPr id="5" name="PPTLabsHighlightTextFragmentsShapefc68ceaa-1053-443f-a0ef-912c85865554"/>
+            <p:cNvPr id="5" name="PPTLabsHighlightTextFragmentsShape2ff5ce2c-a74a-4dfa-9fc1-9f6119a5bc45"/>
             <p:cNvSpPr/>
             <p:nvPr>
               <p:custDataLst>
@@ -12197,7 +12275,7 @@
         </p:sp>
         <p:sp>
           <p:nvSpPr>
-            <p:cNvPr id="4" name="PPTLabsHighlightTextFragmentsShape33a0f774-a9c6-477a-b737-087320594569"/>
+            <p:cNvPr id="4" name="PPTLabsHighlightTextFragmentsShapeeffde813-f2ba-4585-8fea-31a8e9bdea50"/>
             <p:cNvSpPr/>
             <p:nvPr>
               <p:custDataLst>
@@ -12266,7 +12344,7 @@
       </p:grpSp>
       <p:sp>
         <p:nvSpPr>
-          <p:cNvPr id="3" name="PPTLabsHighlightTextFragmentsShape00d575ba-6489-4ae3-85b4-8f4c378adf11"/>
+          <p:cNvPr id="3" name="PPTLabsHighlightTextFragmentsShapea3d8ebe7-4e18-4d43-94ff-9862494c1a22"/>
           <p:cNvSpPr/>
           <p:nvPr>
             <p:custDataLst>
@@ -12334,7 +12412,7 @@
       </p:sp>
       <p:sp>
         <p:nvSpPr>
-          <p:cNvPr id="2" name="文本框 1"/>
+          <p:cNvPr id="2" name="Text Fragments Shape"/>
           <p:cNvSpPr txBox="1"/>
           <p:nvPr/>
         </p:nvSpPr>
@@ -12851,7 +12929,7 @@
     </p:spTree>
     <p:extLst>
       <p:ext uri="{BB962C8B-B14F-4D97-AF65-F5344CB8AC3E}">
-        <p14:creationId xmlns:p14="http://schemas.microsoft.com/office/powerpoint/2010/main" val="1477334906"/>
+        <p14:creationId xmlns:p14="http://schemas.microsoft.com/office/powerpoint/2010/main" val="3715921221"/>
       </p:ext>
     </p:extLst>
   </p:cSld>
@@ -12882,7 +12960,7 @@
                             </p:stCondLst>
                             <p:childTnLst>
                               <p:par>
-                                <p:cTn id="5" presetID="10" presetClass="entr" presetSubtype="0" fill="hold" grpId="0" nodeType="clickEffect">
+                                <p:cTn id="5" presetID="10" presetClass="entr" presetSubtype="0" fill="hold" nodeType="clickEffect">
                                   <p:stCondLst>
                                     <p:cond delay="0"/>
                                   </p:stCondLst>
@@ -12890,59 +12968,6 @@
                                     <p:set>
                                       <p:cBhvr>
                                         <p:cTn id="6" dur="1" fill="hold">
-                                          <p:stCondLst>
-                                            <p:cond delay="0"/>
-                                          </p:stCondLst>
-                                        </p:cTn>
-                                        <p:tgtEl>
-                                          <p:spTgt spid="3"/>
-                                        </p:tgtEl>
-                                        <p:attrNameLst>
-                                          <p:attrName>style.visibility</p:attrName>
-                                        </p:attrNameLst>
-                                      </p:cBhvr>
-                                      <p:to>
-                                        <p:strVal val="visible"/>
-                                      </p:to>
-                                    </p:set>
-                                    <p:animEffect transition="in" filter="fade">
-                                      <p:cBhvr>
-                                        <p:cTn id="7" dur="500"/>
-                                        <p:tgtEl>
-                                          <p:spTgt spid="3"/>
-                                        </p:tgtEl>
-                                      </p:cBhvr>
-                                    </p:animEffect>
-                                  </p:childTnLst>
-                                </p:cTn>
-                              </p:par>
-                            </p:childTnLst>
-                          </p:cTn>
-                        </p:par>
-                      </p:childTnLst>
-                    </p:cTn>
-                  </p:par>
-                  <p:par>
-                    <p:cTn id="8" fill="hold">
-                      <p:stCondLst>
-                        <p:cond delay="indefinite"/>
-                      </p:stCondLst>
-                      <p:childTnLst>
-                        <p:par>
-                          <p:cTn id="9" fill="hold">
-                            <p:stCondLst>
-                              <p:cond delay="0"/>
-                            </p:stCondLst>
-                            <p:childTnLst>
-                              <p:par>
-                                <p:cTn id="10" presetID="10" presetClass="entr" presetSubtype="0" fill="hold" nodeType="clickEffect">
-                                  <p:stCondLst>
-                                    <p:cond delay="0"/>
-                                  </p:stCondLst>
-                                  <p:childTnLst>
-                                    <p:set>
-                                      <p:cBhvr>
-                                        <p:cTn id="11" dur="1" fill="hold">
                                           <p:stCondLst>
                                             <p:cond delay="0"/>
                                           </p:stCondLst>
@@ -12960,7 +12985,7 @@
                                     </p:set>
                                     <p:animEffect transition="in" filter="fade">
                                       <p:cBhvr>
-                                        <p:cTn id="12" dur="500"/>
+                                        <p:cTn id="7" dur="500"/>
                                         <p:tgtEl>
                                           <p:spTgt spid="6"/>
                                         </p:tgtEl>
@@ -12970,14 +12995,14 @@
                                 </p:cTn>
                               </p:par>
                               <p:par>
-                                <p:cTn id="13" presetID="10" presetClass="exit" presetSubtype="0" fill="hold" grpId="1" nodeType="withEffect">
+                                <p:cTn id="8" presetID="10" presetClass="exit" presetSubtype="0" fill="hold" grpId="0" nodeType="withEffect">
                                   <p:stCondLst>
                                     <p:cond delay="0"/>
                                   </p:stCondLst>
                                   <p:childTnLst>
                                     <p:animEffect transition="out" filter="fade">
                                       <p:cBhvr>
-                                        <p:cTn id="14" dur="500"/>
+                                        <p:cTn id="9" dur="500"/>
                                         <p:tgtEl>
                                           <p:spTgt spid="3"/>
                                         </p:tgtEl>
@@ -12985,7 +13010,7 @@
                                     </p:animEffect>
                                     <p:set>
                                       <p:cBhvr>
-                                        <p:cTn id="15" dur="1" fill="hold">
+                                        <p:cTn id="10" dur="1" fill="hold">
                                           <p:stCondLst>
                                             <p:cond delay="499"/>
                                           </p:stCondLst>
@@ -13011,26 +13036,26 @@
                     </p:cTn>
                   </p:par>
                   <p:par>
-                    <p:cTn id="16" fill="hold">
+                    <p:cTn id="11" fill="hold">
                       <p:stCondLst>
                         <p:cond delay="indefinite"/>
                       </p:stCondLst>
                       <p:childTnLst>
                         <p:par>
-                          <p:cTn id="17" fill="hold">
+                          <p:cTn id="12" fill="hold">
                             <p:stCondLst>
                               <p:cond delay="0"/>
                             </p:stCondLst>
                             <p:childTnLst>
                               <p:par>
-                                <p:cTn id="18" presetID="10" presetClass="entr" presetSubtype="0" fill="hold" grpId="0" nodeType="clickEffect">
+                                <p:cTn id="13" presetID="10" presetClass="entr" presetSubtype="0" fill="hold" grpId="0" nodeType="clickEffect">
                                   <p:stCondLst>
                                     <p:cond delay="0"/>
                                   </p:stCondLst>
                                   <p:childTnLst>
                                     <p:set>
                                       <p:cBhvr>
-                                        <p:cTn id="19" dur="1" fill="hold">
+                                        <p:cTn id="14" dur="1" fill="hold">
                                           <p:stCondLst>
                                             <p:cond delay="0"/>
                                           </p:stCondLst>
@@ -13048,7 +13073,7 @@
                                     </p:set>
                                     <p:animEffect transition="in" filter="fade">
                                       <p:cBhvr>
-                                        <p:cTn id="20" dur="500"/>
+                                        <p:cTn id="15" dur="500"/>
                                         <p:tgtEl>
                                           <p:spTgt spid="7"/>
                                         </p:tgtEl>
@@ -13058,14 +13083,14 @@
                                 </p:cTn>
                               </p:par>
                               <p:par>
-                                <p:cTn id="21" presetID="10" presetClass="exit" presetSubtype="0" fill="hold" nodeType="withEffect">
+                                <p:cTn id="16" presetID="10" presetClass="exit" presetSubtype="0" fill="hold" nodeType="withEffect">
                                   <p:stCondLst>
                                     <p:cond delay="0"/>
                                   </p:stCondLst>
                                   <p:childTnLst>
                                     <p:animEffect transition="out" filter="fade">
                                       <p:cBhvr>
-                                        <p:cTn id="22" dur="500"/>
+                                        <p:cTn id="17" dur="500"/>
                                         <p:tgtEl>
                                           <p:spTgt spid="6"/>
                                         </p:tgtEl>
@@ -13073,7 +13098,7 @@
                                     </p:animEffect>
                                     <p:set>
                                       <p:cBhvr>
-                                        <p:cTn id="23" dur="1" fill="hold">
+                                        <p:cTn id="18" dur="1" fill="hold">
                                           <p:stCondLst>
                                             <p:cond delay="499"/>
                                           </p:stCondLst>
@@ -13099,26 +13124,26 @@
                     </p:cTn>
                   </p:par>
                   <p:par>
-                    <p:cTn id="24" fill="hold">
+                    <p:cTn id="19" fill="hold">
                       <p:stCondLst>
                         <p:cond delay="indefinite"/>
                       </p:stCondLst>
                       <p:childTnLst>
                         <p:par>
-                          <p:cTn id="25" fill="hold">
+                          <p:cTn id="20" fill="hold">
                             <p:stCondLst>
                               <p:cond delay="0"/>
                             </p:stCondLst>
                             <p:childTnLst>
                               <p:par>
-                                <p:cTn id="26" presetID="10" presetClass="entr" presetSubtype="0" fill="hold" grpId="0" nodeType="clickEffect">
+                                <p:cTn id="21" presetID="10" presetClass="entr" presetSubtype="0" fill="hold" grpId="0" nodeType="clickEffect">
                                   <p:stCondLst>
                                     <p:cond delay="0"/>
                                   </p:stCondLst>
                                   <p:childTnLst>
                                     <p:set>
                                       <p:cBhvr>
-                                        <p:cTn id="27" dur="1" fill="hold">
+                                        <p:cTn id="22" dur="1" fill="hold">
                                           <p:stCondLst>
                                             <p:cond delay="0"/>
                                           </p:stCondLst>
@@ -13136,7 +13161,7 @@
                                     </p:set>
                                     <p:animEffect transition="in" filter="fade">
                                       <p:cBhvr>
-                                        <p:cTn id="28" dur="500"/>
+                                        <p:cTn id="23" dur="500"/>
                                         <p:tgtEl>
                                           <p:spTgt spid="8"/>
                                         </p:tgtEl>
@@ -13146,14 +13171,14 @@
                                 </p:cTn>
                               </p:par>
                               <p:par>
-                                <p:cTn id="29" presetID="10" presetClass="exit" presetSubtype="0" fill="hold" grpId="1" nodeType="withEffect">
+                                <p:cTn id="24" presetID="10" presetClass="exit" presetSubtype="0" fill="hold" grpId="1" nodeType="withEffect">
                                   <p:stCondLst>
                                     <p:cond delay="0"/>
                                   </p:stCondLst>
                                   <p:childTnLst>
                                     <p:animEffect transition="out" filter="fade">
                                       <p:cBhvr>
-                                        <p:cTn id="30" dur="500"/>
+                                        <p:cTn id="25" dur="500"/>
                                         <p:tgtEl>
                                           <p:spTgt spid="7"/>
                                         </p:tgtEl>
@@ -13161,7 +13186,7 @@
                                     </p:animEffect>
                                     <p:set>
                                       <p:cBhvr>
-                                        <p:cTn id="31" dur="1" fill="hold">
+                                        <p:cTn id="26" dur="1" fill="hold">
                                           <p:stCondLst>
                                             <p:cond delay="499"/>
                                           </p:stCondLst>
@@ -13187,26 +13212,26 @@
                     </p:cTn>
                   </p:par>
                   <p:par>
-                    <p:cTn id="32" fill="hold">
+                    <p:cTn id="27" fill="hold">
                       <p:stCondLst>
                         <p:cond delay="indefinite"/>
                       </p:stCondLst>
                       <p:childTnLst>
                         <p:par>
-                          <p:cTn id="33" fill="hold">
+                          <p:cTn id="28" fill="hold">
                             <p:stCondLst>
                               <p:cond delay="0"/>
                             </p:stCondLst>
                             <p:childTnLst>
                               <p:par>
-                                <p:cTn id="34" presetID="10" presetClass="entr" presetSubtype="0" fill="hold" grpId="0" nodeType="clickEffect">
+                                <p:cTn id="29" presetID="10" presetClass="entr" presetSubtype="0" fill="hold" grpId="0" nodeType="clickEffect">
                                   <p:stCondLst>
                                     <p:cond delay="0"/>
                                   </p:stCondLst>
                                   <p:childTnLst>
                                     <p:set>
                                       <p:cBhvr>
-                                        <p:cTn id="35" dur="1" fill="hold">
+                                        <p:cTn id="30" dur="1" fill="hold">
                                           <p:stCondLst>
                                             <p:cond delay="0"/>
                                           </p:stCondLst>
@@ -13224,7 +13249,7 @@
                                     </p:set>
                                     <p:animEffect transition="in" filter="fade">
                                       <p:cBhvr>
-                                        <p:cTn id="36" dur="500"/>
+                                        <p:cTn id="31" dur="500"/>
                                         <p:tgtEl>
                                           <p:spTgt spid="9"/>
                                         </p:tgtEl>
@@ -13234,14 +13259,14 @@
                                 </p:cTn>
                               </p:par>
                               <p:par>
-                                <p:cTn id="37" presetID="10" presetClass="exit" presetSubtype="0" fill="hold" grpId="1" nodeType="withEffect">
+                                <p:cTn id="32" presetID="10" presetClass="exit" presetSubtype="0" fill="hold" grpId="1" nodeType="withEffect">
                                   <p:stCondLst>
                                     <p:cond delay="0"/>
                                   </p:stCondLst>
                                   <p:childTnLst>
                                     <p:animEffect transition="out" filter="fade">
                                       <p:cBhvr>
-                                        <p:cTn id="38" dur="500"/>
+                                        <p:cTn id="33" dur="500"/>
                                         <p:tgtEl>
                                           <p:spTgt spid="8"/>
                                         </p:tgtEl>
@@ -13249,7 +13274,7 @@
                                     </p:animEffect>
                                     <p:set>
                                       <p:cBhvr>
-                                        <p:cTn id="39" dur="1" fill="hold">
+                                        <p:cTn id="34" dur="1" fill="hold">
                                           <p:stCondLst>
                                             <p:cond delay="499"/>
                                           </p:stCondLst>
@@ -13275,26 +13300,26 @@
                     </p:cTn>
                   </p:par>
                   <p:par>
-                    <p:cTn id="40" fill="hold">
+                    <p:cTn id="35" fill="hold">
                       <p:stCondLst>
                         <p:cond delay="indefinite"/>
                       </p:stCondLst>
                       <p:childTnLst>
                         <p:par>
-                          <p:cTn id="41" fill="hold">
+                          <p:cTn id="36" fill="hold">
                             <p:stCondLst>
                               <p:cond delay="0"/>
                             </p:stCondLst>
                             <p:childTnLst>
                               <p:par>
-                                <p:cTn id="42" presetID="10" presetClass="entr" presetSubtype="0" fill="hold" grpId="0" nodeType="clickEffect">
+                                <p:cTn id="37" presetID="10" presetClass="entr" presetSubtype="0" fill="hold" grpId="0" nodeType="clickEffect">
                                   <p:stCondLst>
                                     <p:cond delay="0"/>
                                   </p:stCondLst>
                                   <p:childTnLst>
                                     <p:set>
                                       <p:cBhvr>
-                                        <p:cTn id="43" dur="1" fill="hold">
+                                        <p:cTn id="38" dur="1" fill="hold">
                                           <p:stCondLst>
                                             <p:cond delay="0"/>
                                           </p:stCondLst>
@@ -13312,7 +13337,7 @@
                                     </p:set>
                                     <p:animEffect transition="in" filter="fade">
                                       <p:cBhvr>
-                                        <p:cTn id="44" dur="500"/>
+                                        <p:cTn id="39" dur="500"/>
                                         <p:tgtEl>
                                           <p:spTgt spid="10"/>
                                         </p:tgtEl>
@@ -13322,14 +13347,14 @@
                                 </p:cTn>
                               </p:par>
                               <p:par>
-                                <p:cTn id="45" presetID="10" presetClass="exit" presetSubtype="0" fill="hold" grpId="1" nodeType="withEffect">
+                                <p:cTn id="40" presetID="10" presetClass="exit" presetSubtype="0" fill="hold" grpId="1" nodeType="withEffect">
                                   <p:stCondLst>
                                     <p:cond delay="0"/>
                                   </p:stCondLst>
                                   <p:childTnLst>
                                     <p:animEffect transition="out" filter="fade">
                                       <p:cBhvr>
-                                        <p:cTn id="46" dur="500"/>
+                                        <p:cTn id="41" dur="500"/>
                                         <p:tgtEl>
                                           <p:spTgt spid="9"/>
                                         </p:tgtEl>
@@ -13337,7 +13362,7 @@
                                     </p:animEffect>
                                     <p:set>
                                       <p:cBhvr>
-                                        <p:cTn id="47" dur="1" fill="hold">
+                                        <p:cTn id="42" dur="1" fill="hold">
                                           <p:stCondLst>
                                             <p:cond delay="499"/>
                                           </p:stCondLst>
@@ -13363,26 +13388,26 @@
                     </p:cTn>
                   </p:par>
                   <p:par>
-                    <p:cTn id="48" fill="hold">
+                    <p:cTn id="43" fill="hold">
                       <p:stCondLst>
                         <p:cond delay="indefinite"/>
                       </p:stCondLst>
                       <p:childTnLst>
                         <p:par>
-                          <p:cTn id="49" fill="hold">
+                          <p:cTn id="44" fill="hold">
                             <p:stCondLst>
                               <p:cond delay="0"/>
                             </p:stCondLst>
                             <p:childTnLst>
                               <p:par>
-                                <p:cTn id="50" presetID="10" presetClass="entr" presetSubtype="0" fill="hold" grpId="0" nodeType="clickEffect">
+                                <p:cTn id="45" presetID="10" presetClass="entr" presetSubtype="0" fill="hold" grpId="0" nodeType="clickEffect">
                                   <p:stCondLst>
                                     <p:cond delay="0"/>
                                   </p:stCondLst>
                                   <p:childTnLst>
                                     <p:set>
                                       <p:cBhvr>
-                                        <p:cTn id="51" dur="1" fill="hold">
+                                        <p:cTn id="46" dur="1" fill="hold">
                                           <p:stCondLst>
                                             <p:cond delay="0"/>
                                           </p:stCondLst>
@@ -13400,7 +13425,7 @@
                                     </p:set>
                                     <p:animEffect transition="in" filter="fade">
                                       <p:cBhvr>
-                                        <p:cTn id="52" dur="500"/>
+                                        <p:cTn id="47" dur="500"/>
                                         <p:tgtEl>
                                           <p:spTgt spid="11"/>
                                         </p:tgtEl>
@@ -13410,14 +13435,14 @@
                                 </p:cTn>
                               </p:par>
                               <p:par>
-                                <p:cTn id="53" presetID="10" presetClass="exit" presetSubtype="0" fill="hold" grpId="1" nodeType="withEffect">
+                                <p:cTn id="48" presetID="10" presetClass="exit" presetSubtype="0" fill="hold" grpId="1" nodeType="withEffect">
                                   <p:stCondLst>
                                     <p:cond delay="0"/>
                                   </p:stCondLst>
                                   <p:childTnLst>
                                     <p:animEffect transition="out" filter="fade">
                                       <p:cBhvr>
-                                        <p:cTn id="54" dur="500"/>
+                                        <p:cTn id="49" dur="500"/>
                                         <p:tgtEl>
                                           <p:spTgt spid="10"/>
                                         </p:tgtEl>
@@ -13425,7 +13450,7 @@
                                     </p:animEffect>
                                     <p:set>
                                       <p:cBhvr>
-                                        <p:cTn id="55" dur="1" fill="hold">
+                                        <p:cTn id="50" dur="1" fill="hold">
                                           <p:stCondLst>
                                             <p:cond delay="499"/>
                                           </p:stCondLst>
@@ -13451,26 +13476,26 @@
                     </p:cTn>
                   </p:par>
                   <p:par>
-                    <p:cTn id="56" fill="hold">
+                    <p:cTn id="51" fill="hold">
                       <p:stCondLst>
                         <p:cond delay="indefinite"/>
                       </p:stCondLst>
                       <p:childTnLst>
                         <p:par>
-                          <p:cTn id="57" fill="hold">
+                          <p:cTn id="52" fill="hold">
                             <p:stCondLst>
                               <p:cond delay="0"/>
                             </p:stCondLst>
                             <p:childTnLst>
                               <p:par>
-                                <p:cTn id="58" presetID="10" presetClass="entr" presetSubtype="0" fill="hold" grpId="0" nodeType="clickEffect">
+                                <p:cTn id="53" presetID="10" presetClass="entr" presetSubtype="0" fill="hold" grpId="0" nodeType="clickEffect">
                                   <p:stCondLst>
                                     <p:cond delay="0"/>
                                   </p:stCondLst>
                                   <p:childTnLst>
                                     <p:set>
                                       <p:cBhvr>
-                                        <p:cTn id="59" dur="1" fill="hold">
+                                        <p:cTn id="54" dur="1" fill="hold">
                                           <p:stCondLst>
                                             <p:cond delay="0"/>
                                           </p:stCondLst>
@@ -13488,7 +13513,7 @@
                                     </p:set>
                                     <p:animEffect transition="in" filter="fade">
                                       <p:cBhvr>
-                                        <p:cTn id="60" dur="500"/>
+                                        <p:cTn id="55" dur="500"/>
                                         <p:tgtEl>
                                           <p:spTgt spid="12"/>
                                         </p:tgtEl>
@@ -13498,14 +13523,14 @@
                                 </p:cTn>
                               </p:par>
                               <p:par>
-                                <p:cTn id="61" presetID="10" presetClass="exit" presetSubtype="0" fill="hold" grpId="1" nodeType="withEffect">
+                                <p:cTn id="56" presetID="10" presetClass="exit" presetSubtype="0" fill="hold" grpId="1" nodeType="withEffect">
                                   <p:stCondLst>
                                     <p:cond delay="0"/>
                                   </p:stCondLst>
                                   <p:childTnLst>
                                     <p:animEffect transition="out" filter="fade">
                                       <p:cBhvr>
-                                        <p:cTn id="62" dur="500"/>
+                                        <p:cTn id="57" dur="500"/>
                                         <p:tgtEl>
                                           <p:spTgt spid="11"/>
                                         </p:tgtEl>
@@ -13513,7 +13538,7 @@
                                     </p:animEffect>
                                     <p:set>
                                       <p:cBhvr>
-                                        <p:cTn id="63" dur="1" fill="hold">
+                                        <p:cTn id="58" dur="1" fill="hold">
                                           <p:stCondLst>
                                             <p:cond delay="499"/>
                                           </p:stCondLst>
@@ -13539,26 +13564,26 @@
                     </p:cTn>
                   </p:par>
                   <p:par>
-                    <p:cTn id="64" fill="hold">
+                    <p:cTn id="59" fill="hold">
                       <p:stCondLst>
                         <p:cond delay="indefinite"/>
                       </p:stCondLst>
                       <p:childTnLst>
                         <p:par>
-                          <p:cTn id="65" fill="hold">
+                          <p:cTn id="60" fill="hold">
                             <p:stCondLst>
                               <p:cond delay="0"/>
                             </p:stCondLst>
                             <p:childTnLst>
                               <p:par>
-                                <p:cTn id="66" presetID="10" presetClass="entr" presetSubtype="0" fill="hold" nodeType="clickEffect">
+                                <p:cTn id="61" presetID="10" presetClass="entr" presetSubtype="0" fill="hold" nodeType="clickEffect">
                                   <p:stCondLst>
                                     <p:cond delay="0"/>
                                   </p:stCondLst>
                                   <p:childTnLst>
                                     <p:set>
                                       <p:cBhvr>
-                                        <p:cTn id="67" dur="1" fill="hold">
+                                        <p:cTn id="62" dur="1" fill="hold">
                                           <p:stCondLst>
                                             <p:cond delay="0"/>
                                           </p:stCondLst>
@@ -13576,7 +13601,7 @@
                                     </p:set>
                                     <p:animEffect transition="in" filter="fade">
                                       <p:cBhvr>
-                                        <p:cTn id="68" dur="500"/>
+                                        <p:cTn id="63" dur="500"/>
                                         <p:tgtEl>
                                           <p:spTgt spid="15"/>
                                         </p:tgtEl>
@@ -13586,14 +13611,14 @@
                                 </p:cTn>
                               </p:par>
                               <p:par>
-                                <p:cTn id="69" presetID="10" presetClass="exit" presetSubtype="0" fill="hold" grpId="1" nodeType="withEffect">
+                                <p:cTn id="64" presetID="10" presetClass="exit" presetSubtype="0" fill="hold" grpId="1" nodeType="withEffect">
                                   <p:stCondLst>
                                     <p:cond delay="0"/>
                                   </p:stCondLst>
                                   <p:childTnLst>
                                     <p:animEffect transition="out" filter="fade">
                                       <p:cBhvr>
-                                        <p:cTn id="70" dur="500"/>
+                                        <p:cTn id="65" dur="500"/>
                                         <p:tgtEl>
                                           <p:spTgt spid="12"/>
                                         </p:tgtEl>
@@ -13601,7 +13626,7 @@
                                     </p:animEffect>
                                     <p:set>
                                       <p:cBhvr>
-                                        <p:cTn id="71" dur="1" fill="hold">
+                                        <p:cTn id="66" dur="1" fill="hold">
                                           <p:stCondLst>
                                             <p:cond delay="499"/>
                                           </p:stCondLst>
@@ -13627,26 +13652,26 @@
                     </p:cTn>
                   </p:par>
                   <p:par>
-                    <p:cTn id="72" fill="hold">
+                    <p:cTn id="67" fill="hold">
                       <p:stCondLst>
                         <p:cond delay="indefinite"/>
                       </p:stCondLst>
                       <p:childTnLst>
                         <p:par>
-                          <p:cTn id="73" fill="hold">
+                          <p:cTn id="68" fill="hold">
                             <p:stCondLst>
                               <p:cond delay="0"/>
                             </p:stCondLst>
                             <p:childTnLst>
                               <p:par>
-                                <p:cTn id="74" presetID="10" presetClass="entr" presetSubtype="0" fill="hold" nodeType="clickEffect">
+                                <p:cTn id="69" presetID="10" presetClass="entr" presetSubtype="0" fill="hold" nodeType="clickEffect">
                                   <p:stCondLst>
                                     <p:cond delay="0"/>
                                   </p:stCondLst>
                                   <p:childTnLst>
                                     <p:set>
                                       <p:cBhvr>
-                                        <p:cTn id="75" dur="1" fill="hold">
+                                        <p:cTn id="70" dur="1" fill="hold">
                                           <p:stCondLst>
                                             <p:cond delay="0"/>
                                           </p:stCondLst>
@@ -13664,7 +13689,7 @@
                                     </p:set>
                                     <p:animEffect transition="in" filter="fade">
                                       <p:cBhvr>
-                                        <p:cTn id="76" dur="500"/>
+                                        <p:cTn id="71" dur="500"/>
                                         <p:tgtEl>
                                           <p:spTgt spid="18"/>
                                         </p:tgtEl>
@@ -13674,14 +13699,14 @@
                                 </p:cTn>
                               </p:par>
                               <p:par>
-                                <p:cTn id="77" presetID="10" presetClass="exit" presetSubtype="0" fill="hold" nodeType="withEffect">
+                                <p:cTn id="72" presetID="10" presetClass="exit" presetSubtype="0" fill="hold" nodeType="withEffect">
                                   <p:stCondLst>
                                     <p:cond delay="0"/>
                                   </p:stCondLst>
                                   <p:childTnLst>
                                     <p:animEffect transition="out" filter="fade">
                                       <p:cBhvr>
-                                        <p:cTn id="78" dur="500"/>
+                                        <p:cTn id="73" dur="500"/>
                                         <p:tgtEl>
                                           <p:spTgt spid="15"/>
                                         </p:tgtEl>
@@ -13689,7 +13714,7 @@
                                     </p:animEffect>
                                     <p:set>
                                       <p:cBhvr>
-                                        <p:cTn id="79" dur="1" fill="hold">
+                                        <p:cTn id="74" dur="1" fill="hold">
                                           <p:stCondLst>
                                             <p:cond delay="499"/>
                                           </p:stCondLst>
@@ -13715,26 +13740,26 @@
                     </p:cTn>
                   </p:par>
                   <p:par>
-                    <p:cTn id="80" fill="hold">
+                    <p:cTn id="75" fill="hold">
                       <p:stCondLst>
                         <p:cond delay="indefinite"/>
                       </p:stCondLst>
                       <p:childTnLst>
                         <p:par>
-                          <p:cTn id="81" fill="hold">
+                          <p:cTn id="76" fill="hold">
                             <p:stCondLst>
                               <p:cond delay="0"/>
                             </p:stCondLst>
                             <p:childTnLst>
                               <p:par>
-                                <p:cTn id="82" presetID="10" presetClass="entr" presetSubtype="0" fill="hold" grpId="0" nodeType="clickEffect">
+                                <p:cTn id="77" presetID="10" presetClass="entr" presetSubtype="0" fill="hold" grpId="0" nodeType="clickEffect">
                                   <p:stCondLst>
                                     <p:cond delay="0"/>
                                   </p:stCondLst>
                                   <p:childTnLst>
                                     <p:set>
                                       <p:cBhvr>
-                                        <p:cTn id="83" dur="1" fill="hold">
+                                        <p:cTn id="78" dur="1" fill="hold">
                                           <p:stCondLst>
                                             <p:cond delay="0"/>
                                           </p:stCondLst>
@@ -13752,7 +13777,7 @@
                                     </p:set>
                                     <p:animEffect transition="in" filter="fade">
                                       <p:cBhvr>
-                                        <p:cTn id="84" dur="500"/>
+                                        <p:cTn id="79" dur="500"/>
                                         <p:tgtEl>
                                           <p:spTgt spid="19"/>
                                         </p:tgtEl>
@@ -13762,14 +13787,14 @@
                                 </p:cTn>
                               </p:par>
                               <p:par>
-                                <p:cTn id="85" presetID="10" presetClass="exit" presetSubtype="0" fill="hold" nodeType="withEffect">
+                                <p:cTn id="80" presetID="10" presetClass="exit" presetSubtype="0" fill="hold" nodeType="withEffect">
                                   <p:stCondLst>
                                     <p:cond delay="0"/>
                                   </p:stCondLst>
                                   <p:childTnLst>
                                     <p:animEffect transition="out" filter="fade">
                                       <p:cBhvr>
-                                        <p:cTn id="86" dur="500"/>
+                                        <p:cTn id="81" dur="500"/>
                                         <p:tgtEl>
                                           <p:spTgt spid="18"/>
                                         </p:tgtEl>
@@ -13777,7 +13802,7 @@
                                     </p:animEffect>
                                     <p:set>
                                       <p:cBhvr>
-                                        <p:cTn id="87" dur="1" fill="hold">
+                                        <p:cTn id="82" dur="1" fill="hold">
                                           <p:stCondLst>
                                             <p:cond delay="499"/>
                                           </p:stCondLst>
@@ -13838,7 +13863,6 @@
       <p:bldP spid="7" grpId="0" animBg="1"/>
       <p:bldP spid="7" grpId="1" animBg="1"/>
       <p:bldP spid="3" grpId="0" animBg="1"/>
-      <p:bldP spid="3" grpId="1" animBg="1"/>
     </p:bldLst>
   </p:timing>
 </p:sld>
@@ -13921,85 +13945,85 @@
 
 <file path=ppt/tags/tag1.xml><?xml version="1.0" encoding="utf-8"?>
 <p:tagLst xmlns:a="http://schemas.openxmlformats.org/drawingml/2006/main" xmlns:r="http://schemas.openxmlformats.org/officeDocument/2006/relationships" xmlns:p="http://schemas.openxmlformats.org/presentationml/2006/main">
-  <p:tag name="HIGHLIGHTTEXTFRAGMENT" val="PPTLabsHighlightTextFragmentsShape88706fb5-d6a2-47f4-9e25-e5d0e2c7e6db"/>
+  <p:tag name="HIGHLIGHTTEXTFRAGMENT" val="PPTLabsHighlightTextFragmentsShape42be768e-f684-4675-98aa-c9b2bd51dd03"/>
 </p:tagLst>
 </file>
 
 <file path=ppt/tags/tag10.xml><?xml version="1.0" encoding="utf-8"?>
 <p:tagLst xmlns:a="http://schemas.openxmlformats.org/drawingml/2006/main" xmlns:r="http://schemas.openxmlformats.org/officeDocument/2006/relationships" xmlns:p="http://schemas.openxmlformats.org/presentationml/2006/main">
-  <p:tag name="HIGHLIGHTTEXTFRAGMENT" val="PPTLabsHighlightTextFragmentsShape33a0f774-a9c6-477a-b737-087320594569"/>
+  <p:tag name="HIGHLIGHTTEXTFRAGMENT" val="PPTLabsHighlightTextFragmentsShapeeffde813-f2ba-4585-8fea-31a8e9bdea50"/>
 </p:tagLst>
 </file>
 
 <file path=ppt/tags/tag11.xml><?xml version="1.0" encoding="utf-8"?>
 <p:tagLst xmlns:a="http://schemas.openxmlformats.org/drawingml/2006/main" xmlns:r="http://schemas.openxmlformats.org/officeDocument/2006/relationships" xmlns:p="http://schemas.openxmlformats.org/presentationml/2006/main">
-  <p:tag name="HIGHLIGHTTEXTFRAGMENT" val="PPTLabsHighlightTextFragmentsShape722dbee3-91b0-4c12-b51f-7fd7eaeee260"/>
+  <p:tag name="HIGHLIGHTTEXTFRAGMENT" val="PPTLabsHighlightTextFragmentsShape2a4fdbf8-f59d-4bbb-917f-7f2c763cadb3"/>
 </p:tagLst>
 </file>
 
 <file path=ppt/tags/tag12.xml><?xml version="1.0" encoding="utf-8"?>
 <p:tagLst xmlns:a="http://schemas.openxmlformats.org/drawingml/2006/main" xmlns:r="http://schemas.openxmlformats.org/officeDocument/2006/relationships" xmlns:p="http://schemas.openxmlformats.org/presentationml/2006/main">
-  <p:tag name="HIGHLIGHTTEXTFRAGMENT" val="PPTLabsHighlightTextFragmentsShape37b7527d-9580-453a-9ac6-d270ec25126b"/>
+  <p:tag name="HIGHLIGHTTEXTFRAGMENT" val="PPTLabsHighlightTextFragmentsShape1c4cd210-7b0a-4fa3-b565-5aa060e4df3f"/>
 </p:tagLst>
 </file>
 
 <file path=ppt/tags/tag13.xml><?xml version="1.0" encoding="utf-8"?>
 <p:tagLst xmlns:a="http://schemas.openxmlformats.org/drawingml/2006/main" xmlns:r="http://schemas.openxmlformats.org/officeDocument/2006/relationships" xmlns:p="http://schemas.openxmlformats.org/presentationml/2006/main">
-  <p:tag name="HIGHLIGHTTEXTFRAGMENT" val="PPTLabsHighlightTextFragmentsShapee5d4cba8-fb8d-4463-8b31-e3b6902340a1"/>
+  <p:tag name="HIGHLIGHTTEXTFRAGMENT" val="PPTLabsHighlightTextFragmentsShapebe35eaa0-db81-4871-8668-46283434c871"/>
 </p:tagLst>
 </file>
 
 <file path=ppt/tags/tag14.xml><?xml version="1.0" encoding="utf-8"?>
 <p:tagLst xmlns:a="http://schemas.openxmlformats.org/drawingml/2006/main" xmlns:r="http://schemas.openxmlformats.org/officeDocument/2006/relationships" xmlns:p="http://schemas.openxmlformats.org/presentationml/2006/main">
-  <p:tag name="HIGHLIGHTTEXTFRAGMENT" val="PPTLabsHighlightTextFragmentsShapea3f2029d-f281-4002-9a91-fa6e6ea7657a"/>
+  <p:tag name="HIGHLIGHTTEXTFRAGMENT" val="PPTLabsHighlightTextFragmentsShapeed78b372-3109-427c-9b4c-91a3f2dbdc86"/>
 </p:tagLst>
 </file>
 
 <file path=ppt/tags/tag2.xml><?xml version="1.0" encoding="utf-8"?>
 <p:tagLst xmlns:a="http://schemas.openxmlformats.org/drawingml/2006/main" xmlns:r="http://schemas.openxmlformats.org/officeDocument/2006/relationships" xmlns:p="http://schemas.openxmlformats.org/presentationml/2006/main">
-  <p:tag name="HIGHLIGHTTEXTFRAGMENT" val="PPTLabsHighlightTextFragmentsShapec84fa0e2-a546-4555-bc44-fbc7bd07f72a"/>
+  <p:tag name="HIGHLIGHTTEXTFRAGMENT" val="PPTLabsHighlightTextFragmentsShape9fe30ee1-d550-4eb2-8af8-0890b879b766"/>
 </p:tagLst>
 </file>
 
 <file path=ppt/tags/tag3.xml><?xml version="1.0" encoding="utf-8"?>
 <p:tagLst xmlns:a="http://schemas.openxmlformats.org/drawingml/2006/main" xmlns:r="http://schemas.openxmlformats.org/officeDocument/2006/relationships" xmlns:p="http://schemas.openxmlformats.org/presentationml/2006/main">
-  <p:tag name="HIGHLIGHTTEXTFRAGMENT" val="PPTLabsHighlightTextFragmentsShapefcbd1772-5bed-4461-9860-2269d9c64877"/>
+  <p:tag name="HIGHLIGHTTEXTFRAGMENT" val="PPTLabsHighlightTextFragmentsShapef5f134a8-737b-4e55-9ffd-ea187eaeb79c"/>
 </p:tagLst>
 </file>
 
 <file path=ppt/tags/tag4.xml><?xml version="1.0" encoding="utf-8"?>
 <p:tagLst xmlns:a="http://schemas.openxmlformats.org/drawingml/2006/main" xmlns:r="http://schemas.openxmlformats.org/officeDocument/2006/relationships" xmlns:p="http://schemas.openxmlformats.org/presentationml/2006/main">
-  <p:tag name="HIGHLIGHTTEXTFRAGMENT" val="PPTLabsHighlightTextFragmentsShape90257b96-eb21-4197-8068-bc71a30536d8"/>
+  <p:tag name="HIGHLIGHTTEXTFRAGMENT" val="PPTLabsHighlightTextFragmentsShape11f79e0a-939f-4b6d-b844-bf0b211f93e8"/>
 </p:tagLst>
 </file>
 
 <file path=ppt/tags/tag5.xml><?xml version="1.0" encoding="utf-8"?>
 <p:tagLst xmlns:a="http://schemas.openxmlformats.org/drawingml/2006/main" xmlns:r="http://schemas.openxmlformats.org/officeDocument/2006/relationships" xmlns:p="http://schemas.openxmlformats.org/presentationml/2006/main">
-  <p:tag name="HIGHLIGHTTEXTFRAGMENT" val="PPTLabsHighlightTextFragmentsShape9e281dfd-af7e-405f-bdb4-9a80c5de65ab"/>
+  <p:tag name="HIGHLIGHTTEXTFRAGMENT" val="PPTLabsHighlightTextFragmentsShape397a058a-b5e8-4724-a23b-f599e8f5fced"/>
 </p:tagLst>
 </file>
 
 <file path=ppt/tags/tag6.xml><?xml version="1.0" encoding="utf-8"?>
 <p:tagLst xmlns:a="http://schemas.openxmlformats.org/drawingml/2006/main" xmlns:r="http://schemas.openxmlformats.org/officeDocument/2006/relationships" xmlns:p="http://schemas.openxmlformats.org/presentationml/2006/main">
-  <p:tag name="HIGHLIGHTTEXTFRAGMENT" val="PPTLabsHighlightTextFragmentsShape2c1872ba-91bc-4c7f-85be-178ce2ac00a3"/>
+  <p:tag name="HIGHLIGHTTEXTFRAGMENT" val="PPTLabsHighlightTextFragmentsShape3cecb501-93ae-45df-9943-5aff4b6d3e4a"/>
 </p:tagLst>
 </file>
 
 <file path=ppt/tags/tag7.xml><?xml version="1.0" encoding="utf-8"?>
 <p:tagLst xmlns:a="http://schemas.openxmlformats.org/drawingml/2006/main" xmlns:r="http://schemas.openxmlformats.org/officeDocument/2006/relationships" xmlns:p="http://schemas.openxmlformats.org/presentationml/2006/main">
-  <p:tag name="HIGHLIGHTTEXTFRAGMENT" val="PPTLabsHighlightTextFragmentsShape734e1cfd-ed01-4166-98e2-c0812f4dd84d"/>
+  <p:tag name="HIGHLIGHTTEXTFRAGMENT" val="PPTLabsHighlightTextFragmentsShape5e55848a-6d4a-440c-9473-d9b431aaef09"/>
 </p:tagLst>
 </file>
 
 <file path=ppt/tags/tag8.xml><?xml version="1.0" encoding="utf-8"?>
 <p:tagLst xmlns:a="http://schemas.openxmlformats.org/drawingml/2006/main" xmlns:r="http://schemas.openxmlformats.org/officeDocument/2006/relationships" xmlns:p="http://schemas.openxmlformats.org/presentationml/2006/main">
-  <p:tag name="HIGHLIGHTTEXTFRAGMENT" val="PPTLabsHighlightTextFragmentsShape00d575ba-6489-4ae3-85b4-8f4c378adf11"/>
+  <p:tag name="HIGHLIGHTTEXTFRAGMENT" val="PPTLabsHighlightTextFragmentsShapea3d8ebe7-4e18-4d43-94ff-9862494c1a22"/>
 </p:tagLst>
 </file>
 
 <file path=ppt/tags/tag9.xml><?xml version="1.0" encoding="utf-8"?>
 <p:tagLst xmlns:a="http://schemas.openxmlformats.org/drawingml/2006/main" xmlns:r="http://schemas.openxmlformats.org/officeDocument/2006/relationships" xmlns:p="http://schemas.openxmlformats.org/presentationml/2006/main">
-  <p:tag name="HIGHLIGHTTEXTFRAGMENT" val="PPTLabsHighlightTextFragmentsShapefc68ceaa-1053-443f-a0ef-912c85865554"/>
+  <p:tag name="HIGHLIGHTTEXTFRAGMENT" val="PPTLabsHighlightTextFragmentsShape2ff5ce2c-a74a-4dfa-9fc1-9f6119a5bc45"/>
 </p:tagLst>
 </file>
 

</xml_diff>